<commit_message>
[V1.5] Add more test case + Update some Logic Command + Update Documentaion
</commit_message>
<xml_diff>
--- a/docs/diagrams/FindTagSequenceDiagram.pptx
+++ b/docs/diagrams/FindTagSequenceDiagram.pptx
@@ -243,7 +243,7 @@
           <a:p>
             <a:fld id="{6BC48BBA-E7BF-4E69-8FDD-B5A9AD5E864B}" type="datetimeFigureOut">
               <a:rPr lang="en-SG" smtClean="0"/>
-              <a:t>30/10/2017</a:t>
+              <a:t>12/11/2017</a:t>
             </a:fld>
             <a:endParaRPr lang="en-SG"/>
           </a:p>
@@ -413,7 +413,7 @@
           <a:p>
             <a:fld id="{6BC48BBA-E7BF-4E69-8FDD-B5A9AD5E864B}" type="datetimeFigureOut">
               <a:rPr lang="en-SG" smtClean="0"/>
-              <a:t>30/10/2017</a:t>
+              <a:t>12/11/2017</a:t>
             </a:fld>
             <a:endParaRPr lang="en-SG"/>
           </a:p>
@@ -593,7 +593,7 @@
           <a:p>
             <a:fld id="{6BC48BBA-E7BF-4E69-8FDD-B5A9AD5E864B}" type="datetimeFigureOut">
               <a:rPr lang="en-SG" smtClean="0"/>
-              <a:t>30/10/2017</a:t>
+              <a:t>12/11/2017</a:t>
             </a:fld>
             <a:endParaRPr lang="en-SG"/>
           </a:p>
@@ -763,7 +763,7 @@
           <a:p>
             <a:fld id="{6BC48BBA-E7BF-4E69-8FDD-B5A9AD5E864B}" type="datetimeFigureOut">
               <a:rPr lang="en-SG" smtClean="0"/>
-              <a:t>30/10/2017</a:t>
+              <a:t>12/11/2017</a:t>
             </a:fld>
             <a:endParaRPr lang="en-SG"/>
           </a:p>
@@ -1009,7 +1009,7 @@
           <a:p>
             <a:fld id="{6BC48BBA-E7BF-4E69-8FDD-B5A9AD5E864B}" type="datetimeFigureOut">
               <a:rPr lang="en-SG" smtClean="0"/>
-              <a:t>30/10/2017</a:t>
+              <a:t>12/11/2017</a:t>
             </a:fld>
             <a:endParaRPr lang="en-SG"/>
           </a:p>
@@ -1241,7 +1241,7 @@
           <a:p>
             <a:fld id="{6BC48BBA-E7BF-4E69-8FDD-B5A9AD5E864B}" type="datetimeFigureOut">
               <a:rPr lang="en-SG" smtClean="0"/>
-              <a:t>30/10/2017</a:t>
+              <a:t>12/11/2017</a:t>
             </a:fld>
             <a:endParaRPr lang="en-SG"/>
           </a:p>
@@ -1608,7 +1608,7 @@
           <a:p>
             <a:fld id="{6BC48BBA-E7BF-4E69-8FDD-B5A9AD5E864B}" type="datetimeFigureOut">
               <a:rPr lang="en-SG" smtClean="0"/>
-              <a:t>30/10/2017</a:t>
+              <a:t>12/11/2017</a:t>
             </a:fld>
             <a:endParaRPr lang="en-SG"/>
           </a:p>
@@ -1726,7 +1726,7 @@
           <a:p>
             <a:fld id="{6BC48BBA-E7BF-4E69-8FDD-B5A9AD5E864B}" type="datetimeFigureOut">
               <a:rPr lang="en-SG" smtClean="0"/>
-              <a:t>30/10/2017</a:t>
+              <a:t>12/11/2017</a:t>
             </a:fld>
             <a:endParaRPr lang="en-SG"/>
           </a:p>
@@ -1821,7 +1821,7 @@
           <a:p>
             <a:fld id="{6BC48BBA-E7BF-4E69-8FDD-B5A9AD5E864B}" type="datetimeFigureOut">
               <a:rPr lang="en-SG" smtClean="0"/>
-              <a:t>30/10/2017</a:t>
+              <a:t>12/11/2017</a:t>
             </a:fld>
             <a:endParaRPr lang="en-SG"/>
           </a:p>
@@ -2098,7 +2098,7 @@
           <a:p>
             <a:fld id="{6BC48BBA-E7BF-4E69-8FDD-B5A9AD5E864B}" type="datetimeFigureOut">
               <a:rPr lang="en-SG" smtClean="0"/>
-              <a:t>30/10/2017</a:t>
+              <a:t>12/11/2017</a:t>
             </a:fld>
             <a:endParaRPr lang="en-SG"/>
           </a:p>
@@ -2351,7 +2351,7 @@
           <a:p>
             <a:fld id="{6BC48BBA-E7BF-4E69-8FDD-B5A9AD5E864B}" type="datetimeFigureOut">
               <a:rPr lang="en-SG" smtClean="0"/>
-              <a:t>30/10/2017</a:t>
+              <a:t>12/11/2017</a:t>
             </a:fld>
             <a:endParaRPr lang="en-SG"/>
           </a:p>
@@ -2567,7 +2567,7 @@
           <a:p>
             <a:fld id="{6BC48BBA-E7BF-4E69-8FDD-B5A9AD5E864B}" type="datetimeFigureOut">
               <a:rPr lang="en-SG" smtClean="0"/>
-              <a:t>30/10/2017</a:t>
+              <a:t>12/11/2017</a:t>
             </a:fld>
             <a:endParaRPr lang="en-SG"/>
           </a:p>
@@ -2988,10 +2988,10 @@
         </p:nvGrpSpPr>
         <p:grpSpPr>
           <a:xfrm>
-            <a:off x="278051" y="753626"/>
-            <a:ext cx="11055222" cy="4994107"/>
-            <a:chOff x="-301498" y="225592"/>
-            <a:chExt cx="11055222" cy="4994107"/>
+            <a:off x="281766" y="753626"/>
+            <a:ext cx="11051507" cy="4994107"/>
+            <a:chOff x="-297783" y="225592"/>
+            <a:chExt cx="11051507" cy="4994107"/>
           </a:xfrm>
         </p:grpSpPr>
         <p:sp>
@@ -3375,10 +3375,10 @@
           </p:nvGrpSpPr>
           <p:grpSpPr>
             <a:xfrm>
-              <a:off x="-301498" y="225592"/>
-              <a:ext cx="11055222" cy="4851233"/>
-              <a:chOff x="-301498" y="225592"/>
-              <a:chExt cx="11055222" cy="4851233"/>
+              <a:off x="-297783" y="225592"/>
+              <a:ext cx="11051507" cy="4851233"/>
+              <a:chOff x="-297783" y="225592"/>
+              <a:chExt cx="11051507" cy="4851233"/>
             </a:xfrm>
           </p:grpSpPr>
           <p:grpSp>
@@ -3389,10 +3389,10 @@
             </p:nvGrpSpPr>
             <p:grpSpPr>
               <a:xfrm>
-                <a:off x="-301498" y="225592"/>
-                <a:ext cx="11055222" cy="4851233"/>
-                <a:chOff x="-301498" y="225592"/>
-                <a:chExt cx="11055222" cy="4851233"/>
+                <a:off x="-297783" y="225592"/>
+                <a:ext cx="11051507" cy="4851233"/>
+                <a:chOff x="-297783" y="225592"/>
+                <a:chExt cx="11051507" cy="4851233"/>
               </a:xfrm>
             </p:grpSpPr>
             <p:grpSp>
@@ -3403,10 +3403,10 @@
               </p:nvGrpSpPr>
               <p:grpSpPr>
                 <a:xfrm>
-                  <a:off x="-301498" y="225592"/>
-                  <a:ext cx="11055222" cy="4851233"/>
-                  <a:chOff x="-301498" y="225592"/>
-                  <a:chExt cx="11055222" cy="4851233"/>
+                  <a:off x="-297783" y="225592"/>
+                  <a:ext cx="11051507" cy="4851233"/>
+                  <a:chOff x="-297783" y="225592"/>
+                  <a:chExt cx="11051507" cy="4851233"/>
                 </a:xfrm>
               </p:grpSpPr>
               <p:sp>
@@ -3473,10 +3473,10 @@
                 </p:nvGrpSpPr>
                 <p:grpSpPr>
                   <a:xfrm>
-                    <a:off x="-301498" y="225592"/>
-                    <a:ext cx="11055222" cy="4851233"/>
-                    <a:chOff x="-301498" y="225592"/>
-                    <a:chExt cx="11055222" cy="4851233"/>
+                    <a:off x="-297783" y="225592"/>
+                    <a:ext cx="11051507" cy="4851233"/>
+                    <a:chOff x="-297783" y="225592"/>
+                    <a:chExt cx="11051507" cy="4851233"/>
                   </a:xfrm>
                 </p:grpSpPr>
                 <p:cxnSp>
@@ -3523,10 +3523,10 @@
                   </p:nvGrpSpPr>
                   <p:grpSpPr>
                     <a:xfrm>
-                      <a:off x="-301498" y="225592"/>
-                      <a:ext cx="9978897" cy="4851233"/>
-                      <a:chOff x="-301498" y="225592"/>
-                      <a:chExt cx="9978897" cy="4851233"/>
+                      <a:off x="-297783" y="225592"/>
+                      <a:ext cx="9975182" cy="4851233"/>
+                      <a:chOff x="-297783" y="225592"/>
+                      <a:chExt cx="9975182" cy="4851233"/>
                     </a:xfrm>
                   </p:grpSpPr>
                   <p:grpSp>
@@ -3537,10 +3537,10 @@
                     </p:nvGrpSpPr>
                     <p:grpSpPr>
                       <a:xfrm>
-                        <a:off x="-301498" y="225592"/>
-                        <a:ext cx="9978897" cy="4851233"/>
-                        <a:chOff x="-301498" y="225592"/>
-                        <a:chExt cx="9978897" cy="4851233"/>
+                        <a:off x="-297783" y="225592"/>
+                        <a:ext cx="9975182" cy="4851233"/>
+                        <a:chOff x="-297783" y="225592"/>
+                        <a:chExt cx="9975182" cy="4851233"/>
                       </a:xfrm>
                     </p:grpSpPr>
                     <p:sp>
@@ -3598,10 +3598,10 @@
                       </p:nvGrpSpPr>
                       <p:grpSpPr>
                         <a:xfrm>
-                          <a:off x="-301498" y="225592"/>
-                          <a:ext cx="8654923" cy="4851233"/>
-                          <a:chOff x="-301498" y="225592"/>
-                          <a:chExt cx="8654923" cy="4851233"/>
+                          <a:off x="-297783" y="225592"/>
+                          <a:ext cx="8651208" cy="4851233"/>
+                          <a:chOff x="-297783" y="225592"/>
+                          <a:chExt cx="8651208" cy="4851233"/>
                         </a:xfrm>
                       </p:grpSpPr>
                       <p:grpSp>
@@ -3612,10 +3612,10 @@
                         </p:nvGrpSpPr>
                         <p:grpSpPr>
                           <a:xfrm>
-                            <a:off x="-301498" y="225592"/>
-                            <a:ext cx="8654923" cy="4851233"/>
-                            <a:chOff x="-301498" y="225592"/>
-                            <a:chExt cx="8654923" cy="4851233"/>
+                            <a:off x="-297783" y="225592"/>
+                            <a:ext cx="8651208" cy="4851233"/>
+                            <a:chOff x="-297783" y="225592"/>
+                            <a:chExt cx="8651208" cy="4851233"/>
                           </a:xfrm>
                         </p:grpSpPr>
                         <p:grpSp>
@@ -3626,10 +3626,10 @@
                           </p:nvGrpSpPr>
                           <p:grpSpPr>
                             <a:xfrm>
-                              <a:off x="-301498" y="225592"/>
-                              <a:ext cx="8654923" cy="4851233"/>
-                              <a:chOff x="-301498" y="225592"/>
-                              <a:chExt cx="8654923" cy="4851233"/>
+                              <a:off x="-297783" y="225592"/>
+                              <a:ext cx="8651208" cy="4851233"/>
+                              <a:chOff x="-297783" y="225592"/>
+                              <a:chExt cx="8651208" cy="4851233"/>
                             </a:xfrm>
                           </p:grpSpPr>
                           <p:grpSp>
@@ -3640,10 +3640,10 @@
                             </p:nvGrpSpPr>
                             <p:grpSpPr>
                               <a:xfrm>
-                                <a:off x="-301498" y="225592"/>
-                                <a:ext cx="8654923" cy="4851233"/>
-                                <a:chOff x="-301498" y="225592"/>
-                                <a:chExt cx="8654923" cy="4851233"/>
+                                <a:off x="-297783" y="225592"/>
+                                <a:ext cx="8651208" cy="4851233"/>
+                                <a:chOff x="-297783" y="225592"/>
+                                <a:chExt cx="8651208" cy="4851233"/>
                               </a:xfrm>
                             </p:grpSpPr>
                             <p:sp>
@@ -3691,23 +3691,7 @@
                                         <a:srgbClr val="0070C0"/>
                                       </a:solidFill>
                                     </a:rPr>
-                                    <a:t>Parser</a:t>
-                                  </a:r>
-                                  <a:r>
-                                    <a:rPr lang="en-SG" sz="1400" dirty="0" smtClean="0">
-                                      <a:solidFill>
-                                        <a:srgbClr val="0070C0"/>
-                                      </a:solidFill>
-                                    </a:rPr>
-                                    <a:t>(“friends</a:t>
-                                  </a:r>
-                                  <a:r>
-                                    <a:rPr lang="en-SG" sz="1400" dirty="0" smtClean="0">
-                                      <a:solidFill>
-                                        <a:srgbClr val="0070C0"/>
-                                      </a:solidFill>
-                                    </a:rPr>
-                                    <a:t>”)</a:t>
+                                    <a:t>Parser(“friends”)</a:t>
                                   </a:r>
                                   <a:endParaRPr lang="en-SG" sz="1400" dirty="0">
                                     <a:solidFill>
@@ -3761,10 +3745,10 @@
                               </p:nvGrpSpPr>
                               <p:grpSpPr>
                                 <a:xfrm>
-                                  <a:off x="-301498" y="225592"/>
-                                  <a:ext cx="8654923" cy="4851233"/>
-                                  <a:chOff x="-301498" y="225592"/>
-                                  <a:chExt cx="8654923" cy="4851233"/>
+                                  <a:off x="-297783" y="225592"/>
+                                  <a:ext cx="8651208" cy="4851233"/>
+                                  <a:chOff x="-297783" y="225592"/>
+                                  <a:chExt cx="8651208" cy="4851233"/>
                                 </a:xfrm>
                               </p:grpSpPr>
                               <p:grpSp>
@@ -3775,10 +3759,10 @@
                                 </p:nvGrpSpPr>
                                 <p:grpSpPr>
                                   <a:xfrm>
-                                    <a:off x="-301498" y="225592"/>
-                                    <a:ext cx="6559424" cy="4851233"/>
-                                    <a:chOff x="-301498" y="225592"/>
-                                    <a:chExt cx="6559424" cy="4851233"/>
+                                    <a:off x="-297783" y="225592"/>
+                                    <a:ext cx="6555709" cy="4851233"/>
+                                    <a:chOff x="-297783" y="225592"/>
+                                    <a:chExt cx="6555709" cy="4851233"/>
                                   </a:xfrm>
                                 </p:grpSpPr>
                                 <p:grpSp>
@@ -3789,10 +3773,10 @@
                                   </p:nvGrpSpPr>
                                   <p:grpSpPr>
                                     <a:xfrm>
-                                      <a:off x="-301498" y="225592"/>
-                                      <a:ext cx="6559424" cy="4851233"/>
-                                      <a:chOff x="-301498" y="225592"/>
-                                      <a:chExt cx="6559424" cy="4851233"/>
+                                      <a:off x="-297783" y="225592"/>
+                                      <a:ext cx="6555709" cy="4851233"/>
+                                      <a:chOff x="-297783" y="225592"/>
+                                      <a:chExt cx="6555709" cy="4851233"/>
                                     </a:xfrm>
                                   </p:grpSpPr>
                                   <p:grpSp>
@@ -3803,10 +3787,10 @@
                                     </p:nvGrpSpPr>
                                     <p:grpSpPr>
                                       <a:xfrm>
-                                        <a:off x="-301498" y="225592"/>
-                                        <a:ext cx="6559424" cy="4851233"/>
-                                        <a:chOff x="-301498" y="225592"/>
-                                        <a:chExt cx="6559424" cy="4851233"/>
+                                        <a:off x="-297783" y="225592"/>
+                                        <a:ext cx="6555709" cy="4851233"/>
+                                        <a:chOff x="-297783" y="225592"/>
+                                        <a:chExt cx="6555709" cy="4851233"/>
                                       </a:xfrm>
                                     </p:grpSpPr>
                                     <p:cxnSp>
@@ -3853,10 +3837,10 @@
                                       </p:nvGrpSpPr>
                                       <p:grpSpPr>
                                         <a:xfrm>
-                                          <a:off x="-301498" y="225592"/>
-                                          <a:ext cx="6559424" cy="4851233"/>
-                                          <a:chOff x="-301498" y="225592"/>
-                                          <a:chExt cx="6559424" cy="4851233"/>
+                                          <a:off x="-297783" y="225592"/>
+                                          <a:ext cx="6555709" cy="4851233"/>
+                                          <a:chOff x="-297783" y="225592"/>
+                                          <a:chExt cx="6555709" cy="4851233"/>
                                         </a:xfrm>
                                       </p:grpSpPr>
                                       <p:grpSp>
@@ -3867,10 +3851,10 @@
                                         </p:nvGrpSpPr>
                                         <p:grpSpPr>
                                           <a:xfrm>
-                                            <a:off x="-301498" y="225592"/>
-                                            <a:ext cx="6559424" cy="4851233"/>
-                                            <a:chOff x="-301498" y="225592"/>
-                                            <a:chExt cx="6559424" cy="4851233"/>
+                                            <a:off x="-297783" y="225592"/>
+                                            <a:ext cx="6555709" cy="4851233"/>
+                                            <a:chOff x="-297783" y="225592"/>
+                                            <a:chExt cx="6555709" cy="4851233"/>
                                           </a:xfrm>
                                         </p:grpSpPr>
                                         <p:grpSp>
@@ -3881,10 +3865,10 @@
                                           </p:nvGrpSpPr>
                                           <p:grpSpPr>
                                             <a:xfrm>
-                                              <a:off x="-301498" y="225592"/>
-                                              <a:ext cx="4511548" cy="4851233"/>
-                                              <a:chOff x="-301498" y="225592"/>
-                                              <a:chExt cx="4511548" cy="4851233"/>
+                                              <a:off x="-297783" y="225592"/>
+                                              <a:ext cx="4507833" cy="4851233"/>
+                                              <a:chOff x="-297783" y="225592"/>
+                                              <a:chExt cx="4507833" cy="4851233"/>
                                             </a:xfrm>
                                           </p:grpSpPr>
                                           <p:grpSp>
@@ -3895,10 +3879,10 @@
                                             </p:nvGrpSpPr>
                                             <p:grpSpPr>
                                               <a:xfrm>
-                                                <a:off x="-301498" y="225592"/>
-                                                <a:ext cx="4511548" cy="4851233"/>
-                                                <a:chOff x="-301498" y="225592"/>
-                                                <a:chExt cx="4511548" cy="4851233"/>
+                                                <a:off x="-297783" y="225592"/>
+                                                <a:ext cx="4507833" cy="4851233"/>
+                                                <a:chOff x="-297783" y="225592"/>
+                                                <a:chExt cx="4507833" cy="4851233"/>
                                               </a:xfrm>
                                             </p:grpSpPr>
                                             <p:grpSp>
@@ -3909,10 +3893,10 @@
                                               </p:nvGrpSpPr>
                                               <p:grpSpPr>
                                                 <a:xfrm>
-                                                  <a:off x="-301498" y="225592"/>
-                                                  <a:ext cx="4511548" cy="4851233"/>
-                                                  <a:chOff x="-130048" y="358942"/>
-                                                  <a:chExt cx="4511548" cy="4851233"/>
+                                                  <a:off x="-297783" y="225592"/>
+                                                  <a:ext cx="4507833" cy="4851233"/>
+                                                  <a:chOff x="-126333" y="358942"/>
+                                                  <a:chExt cx="4507833" cy="4851233"/>
                                                 </a:xfrm>
                                               </p:grpSpPr>
                                               <p:grpSp>
@@ -3923,10 +3907,10 @@
                                                 </p:nvGrpSpPr>
                                                 <p:grpSpPr>
                                                   <a:xfrm>
-                                                    <a:off x="-130048" y="358942"/>
-                                                    <a:ext cx="2749423" cy="4851233"/>
-                                                    <a:chOff x="-130048" y="358942"/>
-                                                    <a:chExt cx="2749423" cy="4851233"/>
+                                                    <a:off x="-126333" y="358942"/>
+                                                    <a:ext cx="2745708" cy="4851233"/>
+                                                    <a:chOff x="-126333" y="358942"/>
+                                                    <a:chExt cx="2745708" cy="4851233"/>
                                                   </a:xfrm>
                                                 </p:grpSpPr>
                                                 <p:grpSp>
@@ -3937,10 +3921,10 @@
                                                   </p:nvGrpSpPr>
                                                   <p:grpSpPr>
                                                     <a:xfrm>
-                                                      <a:off x="-130048" y="358942"/>
-                                                      <a:ext cx="2749423" cy="1412205"/>
-                                                      <a:chOff x="-139573" y="368467"/>
-                                                      <a:chExt cx="2749423" cy="1412205"/>
+                                                      <a:off x="-126333" y="358942"/>
+                                                      <a:ext cx="2745708" cy="1502003"/>
+                                                      <a:chOff x="-135858" y="368467"/>
+                                                      <a:chExt cx="2745708" cy="1502003"/>
                                                     </a:xfrm>
                                                   </p:grpSpPr>
                                                   <p:grpSp>
@@ -4104,7 +4088,7 @@
                                                     </p:nvSpPr>
                                                     <p:spPr>
                                                       <a:xfrm>
-                                                        <a:off x="-139573" y="1325853"/>
+                                                        <a:off x="-135858" y="1415651"/>
                                                         <a:ext cx="2021807" cy="454819"/>
                                                       </a:xfrm>
                                                       <a:prstGeom prst="rect">
@@ -4154,22 +4138,13 @@
                                                           <a:t>(“</a:t>
                                                         </a:r>
                                                         <a:r>
-                                                          <a:rPr lang="en-SG" sz="1400" dirty="0" err="1" smtClean="0">
+                                                          <a:rPr lang="en-SG" sz="1400" dirty="0" smtClean="0">
                                                             <a:solidFill>
                                                               <a:srgbClr val="0070C0"/>
                                                             </a:solidFill>
                                                             <a:sym typeface="Wingdings" panose="05000000000000000000" pitchFamily="2" charset="2"/>
                                                           </a:rPr>
-                                                          <a:t>find</a:t>
-                                                        </a:r>
-                                                        <a:r>
-                                                          <a:rPr lang="en-SG" sz="1400" dirty="0" err="1" smtClean="0">
-                                                            <a:solidFill>
-                                                              <a:srgbClr val="0070C0"/>
-                                                            </a:solidFill>
-                                                            <a:sym typeface="Wingdings" panose="05000000000000000000" pitchFamily="2" charset="2"/>
-                                                          </a:rPr>
-                                                          <a:t>tag</a:t>
+                                                          <a:t>find tag/ </a:t>
                                                         </a:r>
                                                         <a:r>
                                                           <a:rPr lang="en-SG" sz="1400" dirty="0" smtClean="0">
@@ -4178,7 +4153,7 @@
                                                             </a:solidFill>
                                                             <a:sym typeface="Wingdings" panose="05000000000000000000" pitchFamily="2" charset="2"/>
                                                           </a:rPr>
-                                                          <a:t> friends”)</a:t>
+                                                          <a:t>friends”)</a:t>
                                                         </a:r>
                                                         <a:endParaRPr lang="en-SG" sz="1400" dirty="0">
                                                           <a:solidFill>
@@ -4491,7 +4466,7 @@
                                               </p:nvSpPr>
                                               <p:spPr>
                                                 <a:xfrm>
-                                                  <a:off x="1638299" y="1754982"/>
+                                                  <a:off x="1614110" y="1767913"/>
                                                   <a:ext cx="2021807" cy="209550"/>
                                                 </a:xfrm>
                                                 <a:prstGeom prst="rect">
@@ -4542,22 +4517,13 @@
                                                     <a:t>(“</a:t>
                                                   </a:r>
                                                   <a:r>
-                                                    <a:rPr lang="en-SG" sz="1400" dirty="0" err="1" smtClean="0">
+                                                    <a:rPr lang="en-SG" sz="1400" dirty="0" smtClean="0">
                                                       <a:solidFill>
                                                         <a:srgbClr val="0070C0"/>
                                                       </a:solidFill>
                                                       <a:sym typeface="Wingdings" panose="05000000000000000000" pitchFamily="2" charset="2"/>
                                                     </a:rPr>
-                                                    <a:t>find</a:t>
-                                                  </a:r>
-                                                  <a:r>
-                                                    <a:rPr lang="en-SG" sz="1400" dirty="0" err="1" smtClean="0">
-                                                      <a:solidFill>
-                                                        <a:srgbClr val="0070C0"/>
-                                                      </a:solidFill>
-                                                      <a:sym typeface="Wingdings" panose="05000000000000000000" pitchFamily="2" charset="2"/>
-                                                    </a:rPr>
-                                                    <a:t>tag</a:t>
+                                                    <a:t>find tag/ </a:t>
                                                   </a:r>
                                                   <a:r>
                                                     <a:rPr lang="en-SG" sz="1400" dirty="0" smtClean="0">
@@ -4566,16 +4532,7 @@
                                                       </a:solidFill>
                                                       <a:sym typeface="Wingdings" panose="05000000000000000000" pitchFamily="2" charset="2"/>
                                                     </a:rPr>
-                                                    <a:t> friends</a:t>
-                                                  </a:r>
-                                                  <a:r>
-                                                    <a:rPr lang="en-SG" sz="1400" dirty="0" smtClean="0">
-                                                      <a:solidFill>
-                                                        <a:srgbClr val="0070C0"/>
-                                                      </a:solidFill>
-                                                      <a:sym typeface="Wingdings" panose="05000000000000000000" pitchFamily="2" charset="2"/>
-                                                    </a:rPr>
-                                                    <a:t>”)</a:t>
+                                                    <a:t>friends”)</a:t>
                                                   </a:r>
                                                   <a:endParaRPr lang="en-SG" sz="1400" dirty="0">
                                                     <a:solidFill>
@@ -4666,20 +4623,12 @@
                                               <a:p>
                                                 <a:pPr algn="ctr"/>
                                                 <a:r>
-                                                  <a:rPr lang="en-SG" sz="1400" dirty="0" err="1" smtClean="0">
+                                                  <a:rPr lang="en-SG" sz="1400" dirty="0" smtClean="0">
                                                     <a:solidFill>
                                                       <a:srgbClr val="0070C0"/>
                                                     </a:solidFill>
                                                   </a:rPr>
-                                                  <a:t>find</a:t>
-                                                </a:r>
-                                                <a:r>
-                                                  <a:rPr lang="en-SG" sz="1400" dirty="0" err="1" smtClean="0">
-                                                    <a:solidFill>
-                                                      <a:srgbClr val="0070C0"/>
-                                                    </a:solidFill>
-                                                  </a:rPr>
-                                                  <a:t>tag</a:t>
+                                                  <a:t>find tag/</a:t>
                                                 </a:r>
                                                 <a:endParaRPr lang="en-SG" sz="1400" dirty="0">
                                                   <a:solidFill>
@@ -4771,11 +4720,7 @@
                                               </a:r>
                                               <a:r>
                                                 <a:rPr lang="en-SG" dirty="0" err="1" smtClean="0"/>
-                                                <a:t>Find</a:t>
-                                              </a:r>
-                                              <a:r>
-                                                <a:rPr lang="en-SG" dirty="0" err="1" smtClean="0"/>
-                                                <a:t>TagCoomandParser</a:t>
+                                                <a:t>FindTagCoomandParser</a:t>
                                               </a:r>
                                               <a:endParaRPr lang="en-SG" dirty="0"/>
                                             </a:p>
@@ -5064,11 +5009,7 @@
                                     <a:pPr algn="ctr"/>
                                     <a:r>
                                       <a:rPr lang="en-SG" dirty="0" err="1" smtClean="0"/>
-                                      <a:t>find</a:t>
-                                    </a:r>
-                                    <a:r>
-                                      <a:rPr lang="en-SG" dirty="0" err="1" smtClean="0"/>
-                                      <a:t>tag:FindTagCoomand</a:t>
+                                      <a:t>findtag:FindTagCoomand</a:t>
                                     </a:r>
                                     <a:endParaRPr lang="en-SG" dirty="0"/>
                                   </a:p>

</xml_diff>